<commit_message>
AutoCommit_16 июня 2025 г. 3:43:07_SibNout2023
</commit_message>
<xml_diff>
--- a/Дипломы/Федоров Егор Антонович/Prezentatsiya.pptx
+++ b/Дипломы/Федоров Егор Антонович/Prezentatsiya.pptx
@@ -133,6 +133,22 @@
       </a:defRPr>
     </a:lvl9pPr>
   </p:defaultTextStyle>
+  <p:extLst>
+    <p:ext uri="{EFAFB233-063F-42B5-8137-9DF3F51BA10A}">
+      <p15:sldGuideLst xmlns:p15="http://schemas.microsoft.com/office/powerpoint/2012/main">
+        <p15:guide id="1" orient="horz" pos="2381">
+          <p15:clr>
+            <a:srgbClr val="A4A3A4"/>
+          </p15:clr>
+        </p15:guide>
+        <p15:guide id="2" pos="4233">
+          <p15:clr>
+            <a:srgbClr val="A4A3A4"/>
+          </p15:clr>
+        </p15:guide>
+      </p15:sldGuideLst>
+    </p:ext>
+  </p:extLst>
 </p:presentation>
 </file>
 
@@ -708,6 +724,11 @@
         </p:txBody>
       </p:sp>
     </p:spTree>
+    <p:extLst>
+      <p:ext uri="{BB962C8B-B14F-4D97-AF65-F5344CB8AC3E}">
+        <p14:creationId xmlns:p14="http://schemas.microsoft.com/office/powerpoint/2010/main" val="2140292534"/>
+      </p:ext>
+    </p:extLst>
   </p:cSld>
   <p:clrMapOvr>
     <a:masterClrMapping/>
@@ -865,6 +886,11 @@
         </p:txBody>
       </p:sp>
     </p:spTree>
+    <p:extLst>
+      <p:ext uri="{BB962C8B-B14F-4D97-AF65-F5344CB8AC3E}">
+        <p14:creationId xmlns:p14="http://schemas.microsoft.com/office/powerpoint/2010/main" val="1987648329"/>
+      </p:ext>
+    </p:extLst>
   </p:cSld>
   <p:clrMapOvr>
     <a:masterClrMapping/>
@@ -9144,7 +9170,7 @@
           <a:blip r:embed="rId4">
             <a:extLst>
               <a:ext uri="{96DAC541-7B7A-43D3-8B79-37D633B846F1}">
-                <asvg:svgBlip xmlns="" xmlns:p14="http://schemas.microsoft.com/office/powerpoint/2010/main" xmlns:p15="http://schemas.microsoft.com/office/powerpoint/2012/main" xmlns:mc="http://schemas.openxmlformats.org/markup-compatibility/2006" xmlns:asvg="http://schemas.microsoft.com/office/drawing/2016/SVG/main" r:embed="rId5"/>
+                <asvg:svgBlip xmlns:asvg="http://schemas.microsoft.com/office/drawing/2016/SVG/main" xmlns:mc="http://schemas.openxmlformats.org/markup-compatibility/2006" xmlns:p15="http://schemas.microsoft.com/office/powerpoint/2012/main" xmlns:p14="http://schemas.microsoft.com/office/powerpoint/2010/main" xmlns="" r:embed="rId5"/>
               </a:ext>
             </a:extLst>
           </a:blip>
@@ -9316,7 +9342,7 @@
     <mc:Choice Requires="p14">
       <p:transition spd="slow" p14:dur="2000"/>
     </mc:Choice>
-    <mc:Fallback xmlns="" xmlns:p15="http://schemas.microsoft.com/office/powerpoint/2012/main">
+    <mc:Fallback xmlns:p15="http://schemas.microsoft.com/office/powerpoint/2012/main" xmlns="">
       <p:transition spd="slow"/>
     </mc:Fallback>
   </mc:AlternateContent>
@@ -9546,7 +9572,7 @@
     <mc:Choice Requires="p14">
       <p:transition spd="slow" p14:dur="2000"/>
     </mc:Choice>
-    <mc:Fallback xmlns="" xmlns:p15="http://schemas.microsoft.com/office/powerpoint/2012/main">
+    <mc:Fallback xmlns:p15="http://schemas.microsoft.com/office/powerpoint/2012/main" xmlns="">
       <p:transition spd="slow"/>
     </mc:Fallback>
   </mc:AlternateContent>
@@ -9776,7 +9802,7 @@
     <mc:Choice Requires="p14">
       <p:transition spd="slow" p14:dur="2000"/>
     </mc:Choice>
-    <mc:Fallback xmlns="" xmlns:p15="http://schemas.microsoft.com/office/powerpoint/2012/main">
+    <mc:Fallback xmlns:p15="http://schemas.microsoft.com/office/powerpoint/2012/main" xmlns="">
       <p:transition spd="slow"/>
     </mc:Fallback>
   </mc:AlternateContent>
@@ -10006,7 +10032,7 @@
     <mc:Choice Requires="p14">
       <p:transition spd="slow" p14:dur="2000"/>
     </mc:Choice>
-    <mc:Fallback xmlns="" xmlns:p15="http://schemas.microsoft.com/office/powerpoint/2012/main">
+    <mc:Fallback xmlns:p15="http://schemas.microsoft.com/office/powerpoint/2012/main" xmlns="">
       <p:transition spd="slow"/>
     </mc:Fallback>
   </mc:AlternateContent>
@@ -10236,7 +10262,7 @@
     <mc:Choice Requires="p14">
       <p:transition spd="slow" p14:dur="2000"/>
     </mc:Choice>
-    <mc:Fallback xmlns="" xmlns:p15="http://schemas.microsoft.com/office/powerpoint/2012/main">
+    <mc:Fallback xmlns:p15="http://schemas.microsoft.com/office/powerpoint/2012/main" xmlns="">
       <p:transition spd="slow"/>
     </mc:Fallback>
   </mc:AlternateContent>
@@ -12937,7 +12963,7 @@
     <mc:Choice Requires="p14">
       <p:transition spd="slow" p14:dur="2000"/>
     </mc:Choice>
-    <mc:Fallback xmlns="" xmlns:p15="http://schemas.microsoft.com/office/powerpoint/2012/main">
+    <mc:Fallback xmlns:p15="http://schemas.microsoft.com/office/powerpoint/2012/main" xmlns="">
       <p:transition spd="slow"/>
     </mc:Fallback>
   </mc:AlternateContent>
@@ -13077,7 +13103,7 @@
           <a:blip r:embed="rId3">
             <a:extLst>
               <a:ext uri="{96DAC541-7B7A-43D3-8B79-37D633B846F1}">
-                <asvg:svgBlip xmlns="" xmlns:p14="http://schemas.microsoft.com/office/powerpoint/2010/main" xmlns:p15="http://schemas.microsoft.com/office/powerpoint/2012/main" xmlns:mc="http://schemas.openxmlformats.org/markup-compatibility/2006" xmlns:asvg="http://schemas.microsoft.com/office/drawing/2016/SVG/main" r:embed="rId4"/>
+                <asvg:svgBlip xmlns:asvg="http://schemas.microsoft.com/office/drawing/2016/SVG/main" xmlns:mc="http://schemas.openxmlformats.org/markup-compatibility/2006" xmlns:p15="http://schemas.microsoft.com/office/powerpoint/2012/main" xmlns:p14="http://schemas.microsoft.com/office/powerpoint/2010/main" xmlns="" r:embed="rId4"/>
               </a:ext>
             </a:extLst>
           </a:blip>
@@ -13213,7 +13239,7 @@
     <mc:Choice Requires="p14">
       <p:transition spd="slow" p14:dur="2000"/>
     </mc:Choice>
-    <mc:Fallback xmlns="" xmlns:p15="http://schemas.microsoft.com/office/powerpoint/2012/main">
+    <mc:Fallback xmlns:p15="http://schemas.microsoft.com/office/powerpoint/2012/main" xmlns="">
       <p:transition spd="slow"/>
     </mc:Fallback>
   </mc:AlternateContent>
@@ -13497,7 +13523,7 @@
     <mc:Choice Requires="p14">
       <p:transition spd="slow" p14:dur="2000"/>
     </mc:Choice>
-    <mc:Fallback xmlns="" xmlns:p15="http://schemas.microsoft.com/office/powerpoint/2012/main">
+    <mc:Fallback xmlns:p15="http://schemas.microsoft.com/office/powerpoint/2012/main" xmlns="">
       <p:transition spd="slow"/>
     </mc:Fallback>
   </mc:AlternateContent>
@@ -15679,7 +15705,7 @@
     <mc:Choice Requires="p14">
       <p:transition spd="slow" p14:dur="2000"/>
     </mc:Choice>
-    <mc:Fallback xmlns="" xmlns:p15="http://schemas.microsoft.com/office/powerpoint/2012/main">
+    <mc:Fallback xmlns:p15="http://schemas.microsoft.com/office/powerpoint/2012/main" xmlns="">
       <p:transition spd="slow"/>
     </mc:Fallback>
   </mc:AlternateContent>
@@ -15967,7 +15993,7 @@
     <mc:Choice Requires="p14">
       <p:transition spd="slow" p14:dur="2000"/>
     </mc:Choice>
-    <mc:Fallback xmlns="" xmlns:p15="http://schemas.microsoft.com/office/powerpoint/2012/main">
+    <mc:Fallback xmlns:p15="http://schemas.microsoft.com/office/powerpoint/2012/main" xmlns="">
       <p:transition spd="slow"/>
     </mc:Fallback>
   </mc:AlternateContent>
@@ -16319,7 +16345,7 @@
     <mc:Choice Requires="p14">
       <p:transition spd="slow" p14:dur="2000"/>
     </mc:Choice>
-    <mc:Fallback xmlns="" xmlns:p15="http://schemas.microsoft.com/office/powerpoint/2012/main">
+    <mc:Fallback xmlns:p15="http://schemas.microsoft.com/office/powerpoint/2012/main" xmlns="">
       <p:transition spd="slow"/>
     </mc:Fallback>
   </mc:AlternateContent>
@@ -16721,7 +16747,7 @@
     <mc:Choice Requires="p14">
       <p:transition spd="slow" p14:dur="2000"/>
     </mc:Choice>
-    <mc:Fallback xmlns="" xmlns:p15="http://schemas.microsoft.com/office/powerpoint/2012/main">
+    <mc:Fallback xmlns:p15="http://schemas.microsoft.com/office/powerpoint/2012/main" xmlns="">
       <p:transition spd="slow"/>
     </mc:Fallback>
   </mc:AlternateContent>
@@ -21090,7 +21116,7 @@
     <mc:Choice Requires="p14">
       <p:transition spd="slow" p14:dur="2000"/>
     </mc:Choice>
-    <mc:Fallback xmlns="" xmlns:p15="http://schemas.microsoft.com/office/powerpoint/2012/main">
+    <mc:Fallback xmlns:p15="http://schemas.microsoft.com/office/powerpoint/2012/main" xmlns="">
       <p:transition spd="slow"/>
     </mc:Fallback>
   </mc:AlternateContent>
@@ -21357,7 +21383,7 @@
     <mc:Choice Requires="p14">
       <p:transition spd="slow" p14:dur="2000"/>
     </mc:Choice>
-    <mc:Fallback xmlns="" xmlns:p15="http://schemas.microsoft.com/office/powerpoint/2012/main">
+    <mc:Fallback xmlns:p15="http://schemas.microsoft.com/office/powerpoint/2012/main" xmlns="">
       <p:transition spd="slow"/>
     </mc:Fallback>
   </mc:AlternateContent>
@@ -21587,7 +21613,7 @@
     <mc:Choice Requires="p14">
       <p:transition spd="slow" p14:dur="2000"/>
     </mc:Choice>
-    <mc:Fallback xmlns="" xmlns:p15="http://schemas.microsoft.com/office/powerpoint/2012/main">
+    <mc:Fallback xmlns:p15="http://schemas.microsoft.com/office/powerpoint/2012/main" xmlns="">
       <p:transition spd="slow"/>
     </mc:Fallback>
   </mc:AlternateContent>

</xml_diff>